<commit_message>
Update 5. Experimental Philosophy.pptx
</commit_message>
<xml_diff>
--- a/slides/5. Experimental Philosophy.pptx
+++ b/slides/5. Experimental Philosophy.pptx
@@ -6672,7 +6672,7 @@
           <a:p>
             <a:fld id="{8595B328-86D9-4A40-91F8-65F522BFF934}" type="datetimeFigureOut">
               <a:rPr lang="en-US" smtClean="0"/>
-              <a:t>11/17/2021</a:t>
+              <a:t>11/24/2021</a:t>
             </a:fld>
             <a:endParaRPr lang="en-US"/>
           </a:p>
@@ -10199,7 +10199,7 @@
           <a:p>
             <a:fld id="{A464635A-FF06-4676-A9CD-3587A95713EB}" type="datetime1">
               <a:rPr lang="en-US" smtClean="0"/>
-              <a:t>11/17/2021</a:t>
+              <a:t>11/24/2021</a:t>
             </a:fld>
             <a:endParaRPr lang="en-US"/>
           </a:p>
@@ -10488,7 +10488,7 @@
           <a:p>
             <a:fld id="{10B6B60D-56D2-480D-A897-6F2E388764C3}" type="datetime1">
               <a:rPr lang="en-US" smtClean="0"/>
-              <a:t>11/17/2021</a:t>
+              <a:t>11/24/2021</a:t>
             </a:fld>
             <a:endParaRPr lang="en-US"/>
           </a:p>
@@ -10777,7 +10777,7 @@
           <a:p>
             <a:fld id="{9CE8E524-4C4C-467E-8A65-2BAF9E5456BF}" type="datetime1">
               <a:rPr lang="en-US" smtClean="0"/>
-              <a:t>11/17/2021</a:t>
+              <a:t>11/24/2021</a:t>
             </a:fld>
             <a:endParaRPr lang="en-US"/>
           </a:p>
@@ -11066,7 +11066,7 @@
           <a:p>
             <a:fld id="{4EE2A92D-CF97-45C3-BDFA-DB0A32C92184}" type="datetime1">
               <a:rPr lang="en-US" smtClean="0"/>
-              <a:t>11/17/2021</a:t>
+              <a:t>11/24/2021</a:t>
             </a:fld>
             <a:endParaRPr lang="en-US"/>
           </a:p>
@@ -11303,7 +11303,7 @@
           <a:p>
             <a:fld id="{79956E29-A9BB-4798-A3B1-3C0FBA2412B5}" type="datetime1">
               <a:rPr lang="en-US" smtClean="0"/>
-              <a:t>11/17/2021</a:t>
+              <a:t>11/24/2021</a:t>
             </a:fld>
             <a:endParaRPr lang="en-US"/>
           </a:p>
@@ -11760,7 +11760,7 @@
           <a:p>
             <a:fld id="{8A7B2F51-6B5E-48C0-9D4E-83A0B79FED5A}" type="datetime1">
               <a:rPr lang="en-US" smtClean="0"/>
-              <a:t>11/17/2021</a:t>
+              <a:t>11/24/2021</a:t>
             </a:fld>
             <a:endParaRPr lang="en-US"/>
           </a:p>
@@ -11951,7 +11951,7 @@
           <a:p>
             <a:fld id="{E01CD3C2-4B7C-4719-AC8E-B9F740083F9E}" type="datetime1">
               <a:rPr lang="en-US" smtClean="0"/>
-              <a:t>11/17/2021</a:t>
+              <a:t>11/24/2021</a:t>
             </a:fld>
             <a:endParaRPr lang="en-US"/>
           </a:p>
@@ -14821,7 +14821,7 @@
           <a:p>
             <a:fld id="{9490901B-AC82-4F19-8AC2-244975915978}" type="datetime1">
               <a:rPr lang="en-US" smtClean="0"/>
-              <a:t>11/17/2021</a:t>
+              <a:t>11/24/2021</a:t>
             </a:fld>
             <a:endParaRPr lang="en-US"/>
           </a:p>
@@ -15025,7 +15025,7 @@
           <a:p>
             <a:fld id="{D51027F5-6E3B-428C-9928-B50A270A3C8C}" type="datetime1">
               <a:rPr lang="en-US" smtClean="0"/>
-              <a:t>11/17/2021</a:t>
+              <a:t>11/24/2021</a:t>
             </a:fld>
             <a:endParaRPr lang="en-US"/>
           </a:p>
@@ -15226,7 +15226,7 @@
           <a:p>
             <a:fld id="{1D28C071-D63C-4A95-BA20-83652F969B61}" type="datetime1">
               <a:rPr lang="en-US" smtClean="0"/>
-              <a:t>11/17/2021</a:t>
+              <a:t>11/24/2021</a:t>
             </a:fld>
             <a:endParaRPr lang="en-US"/>
           </a:p>
@@ -15488,7 +15488,7 @@
           <a:p>
             <a:fld id="{139F153E-DAE3-47F4-9ECE-DA63FFCEA934}" type="datetime1">
               <a:rPr lang="en-US" smtClean="0"/>
-              <a:t>11/17/2021</a:t>
+              <a:t>11/24/2021</a:t>
             </a:fld>
             <a:endParaRPr lang="en-US"/>
           </a:p>
@@ -15864,7 +15864,7 @@
           <a:p>
             <a:fld id="{FC9E4F1F-2FAB-4F0A-8C45-93B1D388B056}" type="datetime1">
               <a:rPr lang="en-US" smtClean="0"/>
-              <a:t>11/17/2021</a:t>
+              <a:t>11/24/2021</a:t>
             </a:fld>
             <a:endParaRPr lang="en-US"/>
           </a:p>
@@ -17037,7 +17037,7 @@
           <a:p>
             <a:fld id="{7276D31A-6C65-4962-A5D4-EE9B916689A1}" type="datetime1">
               <a:rPr lang="en-US" smtClean="0"/>
-              <a:t>11/17/2021</a:t>
+              <a:t>11/24/2021</a:t>
             </a:fld>
             <a:endParaRPr lang="en-US"/>
           </a:p>
@@ -17326,7 +17326,7 @@
           <a:p>
             <a:fld id="{0A012367-6EE6-4F10-AE32-7A60328FB2C2}" type="datetime1">
               <a:rPr lang="en-US" smtClean="0"/>
-              <a:t>11/17/2021</a:t>
+              <a:t>11/24/2021</a:t>
             </a:fld>
             <a:endParaRPr lang="en-US"/>
           </a:p>
@@ -17615,7 +17615,7 @@
           <a:p>
             <a:fld id="{B7285ED4-E407-4F2A-B02C-2115B5262455}" type="datetime1">
               <a:rPr lang="en-US" smtClean="0"/>
-              <a:t>11/17/2021</a:t>
+              <a:t>11/24/2021</a:t>
             </a:fld>
             <a:endParaRPr lang="en-US"/>
           </a:p>
@@ -18522,7 +18522,7 @@
           <a:p>
             <a:fld id="{5E767F7D-BBFA-4D8E-8716-8BBEAD2DBED4}" type="datetime1">
               <a:rPr lang="en-US" smtClean="0"/>
-              <a:t>11/17/2021</a:t>
+              <a:t>11/24/2021</a:t>
             </a:fld>
             <a:endParaRPr lang="en-US"/>
           </a:p>
@@ -18759,7 +18759,7 @@
           <a:p>
             <a:fld id="{A1C4F03A-C873-4B08-80CF-41CF60853035}" type="datetime1">
               <a:rPr lang="en-US" smtClean="0"/>
-              <a:t>11/17/2021</a:t>
+              <a:t>11/24/2021</a:t>
             </a:fld>
             <a:endParaRPr lang="en-US"/>
           </a:p>
@@ -19263,7 +19263,7 @@
           <a:p>
             <a:fld id="{E4E2D50C-E46D-4EEC-907F-8370E5D95B20}" type="datetime1">
               <a:rPr lang="en-US" smtClean="0"/>
-              <a:t>11/17/2021</a:t>
+              <a:t>11/24/2021</a:t>
             </a:fld>
             <a:endParaRPr lang="en-US"/>
           </a:p>
@@ -19449,7 +19449,7 @@
           <a:p>
             <a:fld id="{3A92F323-EFA7-4DE3-9433-7C2837A93D88}" type="datetime1">
               <a:rPr lang="en-US" smtClean="0"/>
-              <a:t>11/17/2021</a:t>
+              <a:t>11/24/2021</a:t>
             </a:fld>
             <a:endParaRPr lang="en-US"/>
           </a:p>
@@ -20712,7 +20712,7 @@
           <a:p>
             <a:fld id="{D8C7BCEB-607E-4887-84E0-92AE5CC396EB}" type="datetime1">
               <a:rPr lang="en-US" smtClean="0"/>
-              <a:t>11/17/2021</a:t>
+              <a:t>11/24/2021</a:t>
             </a:fld>
             <a:endParaRPr lang="en-US"/>
           </a:p>
@@ -20962,7 +20962,7 @@
           <a:p>
             <a:fld id="{6E2BB5E6-1ADF-4B44-8B89-FF30316E46F0}" type="datetime1">
               <a:rPr lang="en-US" smtClean="0"/>
-              <a:t>11/17/2021</a:t>
+              <a:t>11/24/2021</a:t>
             </a:fld>
             <a:endParaRPr lang="en-US"/>
           </a:p>
@@ -21348,7 +21348,7 @@
           <a:p>
             <a:fld id="{CA26967A-6B39-48F7-935B-EBB469C477EC}" type="datetime1">
               <a:rPr lang="en-US" smtClean="0"/>
-              <a:t>11/17/2021</a:t>
+              <a:t>11/24/2021</a:t>
             </a:fld>
             <a:endParaRPr lang="en-US"/>
           </a:p>
@@ -21608,7 +21608,7 @@
           <a:p>
             <a:fld id="{190FB001-546C-4F53-A715-D65499176A8F}" type="datetime1">
               <a:rPr lang="en-US" smtClean="0"/>
-              <a:t>11/17/2021</a:t>
+              <a:t>11/24/2021</a:t>
             </a:fld>
             <a:endParaRPr lang="en-US"/>
           </a:p>
@@ -23812,7 +23812,7 @@
           <a:p>
             <a:fld id="{C0345775-784E-4D68-83E4-5E576D2797F0}" type="datetime1">
               <a:rPr lang="en-US" smtClean="0"/>
-              <a:t>11/17/2021</a:t>
+              <a:t>11/24/2021</a:t>
             </a:fld>
             <a:endParaRPr lang="en-US"/>
           </a:p>
@@ -28189,194 +28189,6 @@
           </a:p>
         </p:txBody>
       </p:sp>
-      <p:sp>
-        <p:nvSpPr>
-          <p:cNvPr id="5" name="TextBox 4">
-            <a:extLst>
-              <a:ext uri="{FF2B5EF4-FFF2-40B4-BE49-F238E27FC236}">
-                <a16:creationId xmlns:a16="http://schemas.microsoft.com/office/drawing/2014/main" id="{0B454E74-2AD0-4304-ABCE-50373DD23FCA}"/>
-              </a:ext>
-            </a:extLst>
-          </p:cNvPr>
-          <p:cNvSpPr txBox="1"/>
-          <p:nvPr/>
-        </p:nvSpPr>
-        <p:spPr bwMode="gray">
-          <a:xfrm>
-            <a:off x="8440615" y="1830069"/>
-            <a:ext cx="2719753" cy="278811"/>
-          </a:xfrm>
-          <a:prstGeom prst="rect">
-            <a:avLst/>
-          </a:prstGeom>
-          <a:noFill/>
-        </p:spPr>
-        <p:txBody>
-          <a:bodyPr wrap="none" lIns="0" tIns="0" rIns="0" bIns="0" rtlCol="0">
-            <a:noAutofit/>
-          </a:bodyPr>
-          <a:lstStyle/>
-          <a:p>
-            <a:pPr>
-              <a:spcBef>
-                <a:spcPts val="300"/>
-              </a:spcBef>
-              <a:spcAft>
-                <a:spcPts val="300"/>
-              </a:spcAft>
-              <a:buClr>
-                <a:schemeClr val="accent1"/>
-              </a:buClr>
-              <a:buSzPct val="90000"/>
-            </a:pPr>
-            <a:r>
-              <a:rPr lang="en-US" dirty="0"/>
-              <a:t>For tomorrow, Nov. 17</a:t>
-            </a:r>
-          </a:p>
-        </p:txBody>
-      </p:sp>
-      <p:cxnSp>
-        <p:nvCxnSpPr>
-          <p:cNvPr id="7" name="Straight Arrow Connector 6">
-            <a:extLst>
-              <a:ext uri="{FF2B5EF4-FFF2-40B4-BE49-F238E27FC236}">
-                <a16:creationId xmlns:a16="http://schemas.microsoft.com/office/drawing/2014/main" id="{0B705572-3541-4ECE-A7A4-4EC140701D89}"/>
-              </a:ext>
-            </a:extLst>
-          </p:cNvPr>
-          <p:cNvCxnSpPr>
-            <a:cxnSpLocks/>
-          </p:cNvCxnSpPr>
-          <p:nvPr/>
-        </p:nvCxnSpPr>
-        <p:spPr bwMode="gray">
-          <a:xfrm flipH="1">
-            <a:off x="5908431" y="1969477"/>
-            <a:ext cx="2360246" cy="0"/>
-          </a:xfrm>
-          <a:prstGeom prst="straightConnector1">
-            <a:avLst/>
-          </a:prstGeom>
-          <a:ln w="9525" cap="flat" cmpd="sng" algn="ctr">
-            <a:solidFill>
-              <a:schemeClr val="dk1"/>
-            </a:solidFill>
-            <a:prstDash val="solid"/>
-            <a:round/>
-            <a:headEnd type="none" w="med" len="med"/>
-            <a:tailEnd type="arrow" w="med" len="med"/>
-          </a:ln>
-        </p:spPr>
-        <p:style>
-          <a:lnRef idx="0">
-            <a:scrgbClr r="0" g="0" b="0"/>
-          </a:lnRef>
-          <a:fillRef idx="0">
-            <a:scrgbClr r="0" g="0" b="0"/>
-          </a:fillRef>
-          <a:effectRef idx="0">
-            <a:scrgbClr r="0" g="0" b="0"/>
-          </a:effectRef>
-          <a:fontRef idx="minor">
-            <a:schemeClr val="tx1"/>
-          </a:fontRef>
-        </p:style>
-      </p:cxnSp>
-      <p:sp>
-        <p:nvSpPr>
-          <p:cNvPr id="9" name="TextBox 8">
-            <a:extLst>
-              <a:ext uri="{FF2B5EF4-FFF2-40B4-BE49-F238E27FC236}">
-                <a16:creationId xmlns:a16="http://schemas.microsoft.com/office/drawing/2014/main" id="{D6549004-6C42-4EB4-8139-BB8E4CD3AFB9}"/>
-              </a:ext>
-            </a:extLst>
-          </p:cNvPr>
-          <p:cNvSpPr txBox="1"/>
-          <p:nvPr/>
-        </p:nvSpPr>
-        <p:spPr bwMode="gray">
-          <a:xfrm>
-            <a:off x="8440615" y="3250043"/>
-            <a:ext cx="2649415" cy="278816"/>
-          </a:xfrm>
-          <a:prstGeom prst="rect">
-            <a:avLst/>
-          </a:prstGeom>
-          <a:noFill/>
-        </p:spPr>
-        <p:txBody>
-          <a:bodyPr wrap="none" lIns="0" tIns="0" rIns="0" bIns="0" rtlCol="0">
-            <a:noAutofit/>
-          </a:bodyPr>
-          <a:lstStyle/>
-          <a:p>
-            <a:pPr>
-              <a:spcBef>
-                <a:spcPts val="300"/>
-              </a:spcBef>
-              <a:spcAft>
-                <a:spcPts val="300"/>
-              </a:spcAft>
-              <a:buClr>
-                <a:schemeClr val="accent1"/>
-              </a:buClr>
-              <a:buSzPct val="90000"/>
-            </a:pPr>
-            <a:r>
-              <a:rPr lang="en-US" dirty="0"/>
-              <a:t>For Monday, Nov. 23</a:t>
-            </a:r>
-          </a:p>
-        </p:txBody>
-      </p:sp>
-      <p:cxnSp>
-        <p:nvCxnSpPr>
-          <p:cNvPr id="10" name="Straight Arrow Connector 9">
-            <a:extLst>
-              <a:ext uri="{FF2B5EF4-FFF2-40B4-BE49-F238E27FC236}">
-                <a16:creationId xmlns:a16="http://schemas.microsoft.com/office/drawing/2014/main" id="{D9DE39D0-EEAE-4A3D-A6E2-C836F52F55B1}"/>
-              </a:ext>
-            </a:extLst>
-          </p:cNvPr>
-          <p:cNvCxnSpPr>
-            <a:cxnSpLocks/>
-          </p:cNvCxnSpPr>
-          <p:nvPr/>
-        </p:nvCxnSpPr>
-        <p:spPr bwMode="gray">
-          <a:xfrm flipH="1">
-            <a:off x="5845908" y="3429000"/>
-            <a:ext cx="2422769" cy="486508"/>
-          </a:xfrm>
-          <a:prstGeom prst="straightConnector1">
-            <a:avLst/>
-          </a:prstGeom>
-          <a:ln w="9525" cap="flat" cmpd="sng" algn="ctr">
-            <a:solidFill>
-              <a:schemeClr val="dk1"/>
-            </a:solidFill>
-            <a:prstDash val="solid"/>
-            <a:round/>
-            <a:headEnd type="none" w="med" len="med"/>
-            <a:tailEnd type="arrow" w="med" len="med"/>
-          </a:ln>
-        </p:spPr>
-        <p:style>
-          <a:lnRef idx="0">
-            <a:scrgbClr r="0" g="0" b="0"/>
-          </a:lnRef>
-          <a:fillRef idx="0">
-            <a:scrgbClr r="0" g="0" b="0"/>
-          </a:fillRef>
-          <a:effectRef idx="0">
-            <a:scrgbClr r="0" g="0" b="0"/>
-          </a:effectRef>
-          <a:fontRef idx="minor">
-            <a:schemeClr val="tx1"/>
-          </a:fontRef>
-        </p:style>
-      </p:cxnSp>
     </p:spTree>
     <p:extLst>
       <p:ext uri="{BB962C8B-B14F-4D97-AF65-F5344CB8AC3E}">

</xml_diff>